<commit_message>
add current Dokumentation, PowerPoint
</commit_message>
<xml_diff>
--- a/Power Point/SSPS_11.12_sketch.pptx
+++ b/Power Point/SSPS_11.12_sketch.pptx
@@ -210,7 +210,7 @@
           <a:p>
             <a:fld id="{1BD3FA11-E74D-424F-9AF9-4FB3E3C76A33}" type="datetimeFigureOut">
               <a:rPr lang="en-US" smtClean="0"/>
-              <a:t>12/11/2024</a:t>
+              <a:t>1/18/2025</a:t>
             </a:fld>
             <a:endParaRPr lang="en-US"/>
           </a:p>
@@ -625,7 +625,7 @@
           <a:p>
             <a:fld id="{9D6937DF-4E0C-4BDE-8A0A-EA2E03F3CD75}" type="datetime1">
               <a:rPr lang="de-DE" smtClean="0"/>
-              <a:t>11.12.2024</a:t>
+              <a:t>18.01.2025</a:t>
             </a:fld>
             <a:endParaRPr lang="de-DE"/>
           </a:p>
@@ -823,7 +823,7 @@
           <a:p>
             <a:fld id="{EB80D259-FD4B-4365-9AA3-F6CED0046B76}" type="datetime1">
               <a:rPr lang="de-DE" smtClean="0"/>
-              <a:t>11.12.2024</a:t>
+              <a:t>18.01.2025</a:t>
             </a:fld>
             <a:endParaRPr lang="de-DE"/>
           </a:p>
@@ -1031,7 +1031,7 @@
           <a:p>
             <a:fld id="{5DC2BD21-A82E-44BA-95E6-C97C344CDF55}" type="datetime1">
               <a:rPr lang="de-DE" smtClean="0"/>
-              <a:t>11.12.2024</a:t>
+              <a:t>18.01.2025</a:t>
             </a:fld>
             <a:endParaRPr lang="de-DE"/>
           </a:p>
@@ -1229,7 +1229,7 @@
           <a:p>
             <a:fld id="{F93171F1-3AC1-4821-9122-C904B048FE43}" type="datetime1">
               <a:rPr lang="de-DE" smtClean="0"/>
-              <a:t>11.12.2024</a:t>
+              <a:t>18.01.2025</a:t>
             </a:fld>
             <a:endParaRPr lang="de-DE"/>
           </a:p>
@@ -1504,7 +1504,7 @@
           <a:p>
             <a:fld id="{6A36EF52-4910-4C2D-8CF3-4DB6C99B4BD5}" type="datetime1">
               <a:rPr lang="de-DE" smtClean="0"/>
-              <a:t>11.12.2024</a:t>
+              <a:t>18.01.2025</a:t>
             </a:fld>
             <a:endParaRPr lang="de-DE"/>
           </a:p>
@@ -1769,7 +1769,7 @@
           <a:p>
             <a:fld id="{185202DE-F5EC-4844-90C4-75EB9E59292C}" type="datetime1">
               <a:rPr lang="de-DE" smtClean="0"/>
-              <a:t>11.12.2024</a:t>
+              <a:t>18.01.2025</a:t>
             </a:fld>
             <a:endParaRPr lang="de-DE"/>
           </a:p>
@@ -2181,7 +2181,7 @@
           <a:p>
             <a:fld id="{93226BE8-CE1A-44BA-B043-BB8219D521B8}" type="datetime1">
               <a:rPr lang="de-DE" smtClean="0"/>
-              <a:t>11.12.2024</a:t>
+              <a:t>18.01.2025</a:t>
             </a:fld>
             <a:endParaRPr lang="de-DE"/>
           </a:p>
@@ -2322,7 +2322,7 @@
           <a:p>
             <a:fld id="{77536EA2-277B-4F32-BBD7-E718D7F3C975}" type="datetime1">
               <a:rPr lang="de-DE" smtClean="0"/>
-              <a:t>11.12.2024</a:t>
+              <a:t>18.01.2025</a:t>
             </a:fld>
             <a:endParaRPr lang="de-DE"/>
           </a:p>
@@ -2435,7 +2435,7 @@
           <a:p>
             <a:fld id="{28A080B9-28ED-42A6-9FFE-BC3E1F17444A}" type="datetime1">
               <a:rPr lang="de-DE" smtClean="0"/>
-              <a:t>11.12.2024</a:t>
+              <a:t>18.01.2025</a:t>
             </a:fld>
             <a:endParaRPr lang="de-DE"/>
           </a:p>
@@ -2746,7 +2746,7 @@
           <a:p>
             <a:fld id="{585322BD-A736-420C-8D41-F3A667DCA06D}" type="datetime1">
               <a:rPr lang="de-DE" smtClean="0"/>
-              <a:t>11.12.2024</a:t>
+              <a:t>18.01.2025</a:t>
             </a:fld>
             <a:endParaRPr lang="de-DE"/>
           </a:p>
@@ -3034,7 +3034,7 @@
           <a:p>
             <a:fld id="{56F37B7C-2BE5-47E3-9028-2102B2B00543}" type="datetime1">
               <a:rPr lang="de-DE" smtClean="0"/>
-              <a:t>11.12.2024</a:t>
+              <a:t>18.01.2025</a:t>
             </a:fld>
             <a:endParaRPr lang="de-DE"/>
           </a:p>
@@ -3275,7 +3275,7 @@
           <a:p>
             <a:fld id="{8EBB7E99-C74A-49F1-8D09-92A944F1D2C7}" type="datetime1">
               <a:rPr lang="de-DE" smtClean="0"/>
-              <a:t>11.12.2024</a:t>
+              <a:t>18.01.2025</a:t>
             </a:fld>
             <a:endParaRPr lang="de-DE"/>
           </a:p>
@@ -3744,15 +3744,7 @@
           <a:p>
             <a:r>
               <a:rPr lang="de-DE" dirty="0"/>
-              <a:t>SSPS 24/25 </a:t>
-            </a:r>
-            <a:r>
-              <a:rPr lang="de-DE" dirty="0" err="1"/>
-              <a:t>Kurilin</a:t>
-            </a:r>
-            <a:r>
-              <a:rPr lang="de-DE" dirty="0"/>
-              <a:t>, </a:t>
+              <a:t>SSDS 24/25 Kurilin, </a:t>
             </a:r>
             <a:r>
               <a:rPr lang="de-DE" dirty="0" err="1"/>
@@ -4157,7 +4149,7 @@
           <a:p>
             <a:fld id="{F93171F1-3AC1-4821-9122-C904B048FE43}" type="datetime1">
               <a:rPr lang="de-DE" smtClean="0"/>
-              <a:t>11.12.2024</a:t>
+              <a:t>18.01.2025</a:t>
             </a:fld>
             <a:endParaRPr lang="de-DE"/>
           </a:p>
@@ -4745,7 +4737,7 @@
           <a:p>
             <a:fld id="{F93171F1-3AC1-4821-9122-C904B048FE43}" type="datetime1">
               <a:rPr lang="de-DE" smtClean="0"/>
-              <a:t>11.12.2024</a:t>
+              <a:t>18.01.2025</a:t>
             </a:fld>
             <a:endParaRPr lang="de-DE"/>
           </a:p>
@@ -4956,7 +4948,7 @@
           <a:p>
             <a:fld id="{BD24458A-0043-4E4F-8027-3992B36F2154}" type="datetime1">
               <a:rPr lang="de-DE" smtClean="0"/>
-              <a:t>11.12.2024</a:t>
+              <a:t>18.01.2025</a:t>
             </a:fld>
             <a:endParaRPr lang="de-DE"/>
           </a:p>
@@ -5127,7 +5119,7 @@
           <a:p>
             <a:fld id="{5DF3E358-6AEA-4C2D-970A-3E87B577A52D}" type="datetime1">
               <a:rPr lang="de-DE" smtClean="0"/>
-              <a:t>11.12.2024</a:t>
+              <a:t>18.01.2025</a:t>
             </a:fld>
             <a:endParaRPr lang="de-DE"/>
           </a:p>
@@ -5950,7 +5942,7 @@
           <a:p>
             <a:fld id="{5FA4DF8F-3F4F-4AA2-9FEF-C29C6C768E8D}" type="datetime1">
               <a:rPr lang="de-DE" smtClean="0"/>
-              <a:t>11.12.2024</a:t>
+              <a:t>18.01.2025</a:t>
             </a:fld>
             <a:endParaRPr lang="de-DE"/>
           </a:p>
@@ -6144,7 +6136,7 @@
           <a:p>
             <a:fld id="{DBDC02CD-66B0-4A7F-A9B0-60DAC400A60B}" type="datetime1">
               <a:rPr lang="de-DE" smtClean="0"/>
-              <a:t>11.12.2024</a:t>
+              <a:t>18.01.2025</a:t>
             </a:fld>
             <a:endParaRPr lang="de-DE"/>
           </a:p>
@@ -6701,7 +6693,7 @@
           <a:p>
             <a:fld id="{2D3D10DD-2A20-4C94-B6F1-82D8CB10BE32}" type="datetime1">
               <a:rPr lang="de-DE" smtClean="0"/>
-              <a:t>11.12.2024</a:t>
+              <a:t>18.01.2025</a:t>
             </a:fld>
             <a:endParaRPr lang="de-DE"/>
           </a:p>
@@ -6733,94 +6725,6 @@
               <a:t>3</a:t>
             </a:fld>
             <a:endParaRPr lang="de-DE"/>
-          </a:p>
-        </p:txBody>
-      </p:sp>
-      <p:sp>
-        <p:nvSpPr>
-          <p:cNvPr id="33" name="Textfeld 32">
-            <a:extLst>
-              <a:ext uri="{FF2B5EF4-FFF2-40B4-BE49-F238E27FC236}">
-                <a16:creationId xmlns:a16="http://schemas.microsoft.com/office/drawing/2014/main" id="{DB18817B-38D7-8C77-2BFA-CD42ADFDEA5E}"/>
-              </a:ext>
-            </a:extLst>
-          </p:cNvPr>
-          <p:cNvSpPr txBox="1"/>
-          <p:nvPr/>
-        </p:nvSpPr>
-        <p:spPr>
-          <a:xfrm>
-            <a:off x="3047998" y="5219832"/>
-            <a:ext cx="6096000" cy="646331"/>
-          </a:xfrm>
-          <a:prstGeom prst="rect">
-            <a:avLst/>
-          </a:prstGeom>
-          <a:noFill/>
-        </p:spPr>
-        <p:txBody>
-          <a:bodyPr wrap="square">
-            <a:spAutoFit/>
-          </a:bodyPr>
-          <a:lstStyle/>
-          <a:p>
-            <a:r>
-              <a:rPr lang="en-US" dirty="0"/>
-              <a:t>… </a:t>
-            </a:r>
-            <a:r>
-              <a:rPr lang="en-US" dirty="0" err="1"/>
-              <a:t>dabei</a:t>
-            </a:r>
-            <a:r>
-              <a:rPr lang="en-US" dirty="0"/>
-              <a:t> </a:t>
-            </a:r>
-            <a:r>
-              <a:rPr lang="en-US" dirty="0" err="1"/>
-              <a:t>wird</a:t>
-            </a:r>
-            <a:r>
-              <a:rPr lang="en-US" dirty="0"/>
-              <a:t> </a:t>
-            </a:r>
-            <a:r>
-              <a:rPr lang="en-US" dirty="0" err="1"/>
-              <a:t>hier</a:t>
-            </a:r>
-            <a:r>
-              <a:rPr lang="en-US" dirty="0"/>
-              <a:t> die </a:t>
-            </a:r>
-            <a:r>
-              <a:rPr lang="en-US" dirty="0" err="1"/>
-              <a:t>Distanz</a:t>
-            </a:r>
-            <a:r>
-              <a:rPr lang="en-US" dirty="0"/>
-              <a:t> </a:t>
-            </a:r>
-            <a:r>
-              <a:rPr lang="en-US" dirty="0" err="1"/>
-              <a:t>mit</a:t>
-            </a:r>
-            <a:r>
-              <a:rPr lang="en-US" dirty="0"/>
-              <a:t> der </a:t>
-            </a:r>
-            <a:r>
-              <a:rPr lang="en-US" dirty="0" err="1"/>
-              <a:t>Euklidischen</a:t>
-            </a:r>
-            <a:r>
-              <a:rPr lang="en-US" dirty="0"/>
-              <a:t> Norm </a:t>
-            </a:r>
-            <a:r>
-              <a:rPr lang="en-US" dirty="0" err="1"/>
-              <a:t>berechnet</a:t>
-            </a:r>
-            <a:endParaRPr lang="en-US" dirty="0"/>
           </a:p>
         </p:txBody>
       </p:sp>
@@ -7084,7 +6988,7 @@
           <a:p>
             <a:fld id="{FFDF0BBE-802C-4922-9F54-CA93643B59F9}" type="datetime1">
               <a:rPr lang="de-DE" smtClean="0"/>
-              <a:t>11.12.2024</a:t>
+              <a:t>18.01.2025</a:t>
             </a:fld>
             <a:endParaRPr lang="de-DE"/>
           </a:p>
@@ -7464,7 +7368,7 @@
           <a:p>
             <a:fld id="{B86F56DF-FCB8-4D15-884B-940867336489}" type="datetime1">
               <a:rPr lang="de-DE" smtClean="0"/>
-              <a:t>11.12.2024</a:t>
+              <a:t>18.01.2025</a:t>
             </a:fld>
             <a:endParaRPr lang="de-DE"/>
           </a:p>
@@ -7630,7 +7534,7 @@
           <a:p>
             <a:fld id="{746B4C57-E489-4B0D-855B-6CF28BDB2031}" type="datetime1">
               <a:rPr lang="de-DE" smtClean="0"/>
-              <a:t>11.12.2024</a:t>
+              <a:t>18.01.2025</a:t>
             </a:fld>
             <a:endParaRPr lang="de-DE"/>
           </a:p>
@@ -7747,7 +7651,7 @@
           <a:p>
             <a:fld id="{F93171F1-3AC1-4821-9122-C904B048FE43}" type="datetime1">
               <a:rPr lang="de-DE" smtClean="0"/>
-              <a:t>11.12.2024</a:t>
+              <a:t>18.01.2025</a:t>
             </a:fld>
             <a:endParaRPr lang="de-DE"/>
           </a:p>
@@ -8210,7 +8114,7 @@
           <a:p>
             <a:fld id="{B19C0ABB-DBBF-464C-A96B-FED2BC8E1520}" type="datetime1">
               <a:rPr lang="de-DE" smtClean="0"/>
-              <a:t>11.12.2024</a:t>
+              <a:t>18.01.2025</a:t>
             </a:fld>
             <a:endParaRPr lang="de-DE"/>
           </a:p>
@@ -9446,7 +9350,7 @@
           <a:p>
             <a:fld id="{F93171F1-3AC1-4821-9122-C904B048FE43}" type="datetime1">
               <a:rPr lang="de-DE" smtClean="0"/>
-              <a:t>11.12.2024</a:t>
+              <a:t>18.01.2025</a:t>
             </a:fld>
             <a:endParaRPr lang="de-DE"/>
           </a:p>

</xml_diff>